<commit_message>
Preparing for final submission vol. 1
</commit_message>
<xml_diff>
--- a/lazy-evaluation.pptx
+++ b/lazy-evaluation.pptx
@@ -238,7 +238,7 @@
             <a:fld id="{6157B46F-5EA3-4DD0-A62A-4A5D93D21E2D}" type="datetimeFigureOut">
               <a:rPr lang="fi-FI" smtClean="0"/>
               <a:pPr/>
-              <a:t>11.12.2017</a:t>
+              <a:t>12.12.2017</a:t>
             </a:fld>
             <a:endParaRPr lang="fi-FI"/>
           </a:p>
@@ -409,7 +409,7 @@
             <a:fld id="{37303B11-5EFE-4A3B-B7C0-4ADE873E5104}" type="datetimeFigureOut">
               <a:rPr lang="fi-FI" smtClean="0"/>
               <a:pPr/>
-              <a:t>11.12.2017</a:t>
+              <a:t>12.12.2017</a:t>
             </a:fld>
             <a:endParaRPr lang="fi-FI"/>
           </a:p>
@@ -958,7 +958,7 @@
             <a:fld id="{DBA86B29-D8EF-4DBC-BC2D-E6AEDE3E70DD}" type="datetime1">
               <a:rPr lang="en-US" noProof="0" smtClean="0"/>
               <a:pPr/>
-              <a:t>12/11/17</a:t>
+              <a:t>12/12/17</a:t>
             </a:fld>
             <a:endParaRPr lang="fi-FI" noProof="0"/>
           </a:p>
@@ -1420,7 +1420,7 @@
             <a:fld id="{31C9BAAA-DC1B-49F7-BD70-3EB5E77C19D9}" type="datetime1">
               <a:rPr lang="en-US" noProof="0" smtClean="0"/>
               <a:pPr/>
-              <a:t>12/11/17</a:t>
+              <a:t>12/12/17</a:t>
             </a:fld>
             <a:endParaRPr lang="fi-FI" noProof="0"/>
           </a:p>
@@ -1909,7 +1909,7 @@
             <a:fld id="{30CCFA59-C1FC-453C-854B-451EFFB09889}" type="datetime1">
               <a:rPr lang="en-US" noProof="0" smtClean="0"/>
               <a:pPr/>
-              <a:t>12/11/17</a:t>
+              <a:t>12/12/17</a:t>
             </a:fld>
             <a:endParaRPr lang="fi-FI" noProof="0"/>
           </a:p>
@@ -2224,7 +2224,7 @@
             <a:fld id="{7292EEDF-BCED-41D6-9DF9-36322087F403}" type="datetime1">
               <a:rPr lang="en-US" noProof="0" smtClean="0"/>
               <a:pPr/>
-              <a:t>12/11/17</a:t>
+              <a:t>12/12/17</a:t>
             </a:fld>
             <a:endParaRPr lang="fi-FI" noProof="0"/>
           </a:p>
@@ -2516,7 +2516,7 @@
             <a:fld id="{C308204F-E4C8-4D0B-A504-EFCA81D9CAC1}" type="datetime1">
               <a:rPr lang="en-US" noProof="0" smtClean="0"/>
               <a:pPr/>
-              <a:t>12/11/17</a:t>
+              <a:t>12/12/17</a:t>
             </a:fld>
             <a:endParaRPr lang="fi-FI" noProof="0"/>
           </a:p>
@@ -2888,7 +2888,7 @@
             <a:fld id="{F48D1944-F3A1-4EB2-8265-944DC75FDAD4}" type="datetime1">
               <a:rPr lang="en-US" noProof="0" smtClean="0"/>
               <a:pPr/>
-              <a:t>12/11/17</a:t>
+              <a:t>12/12/17</a:t>
             </a:fld>
             <a:endParaRPr lang="fi-FI" noProof="0"/>
           </a:p>
@@ -3373,7 +3373,7 @@
             <a:fld id="{115E7FC3-E054-4981-ABB1-6939CA2C98CA}" type="datetime1">
               <a:rPr lang="en-US" noProof="0" smtClean="0"/>
               <a:pPr/>
-              <a:t>12/11/17</a:t>
+              <a:t>12/12/17</a:t>
             </a:fld>
             <a:endParaRPr lang="fi-FI" noProof="0"/>
           </a:p>
@@ -3868,7 +3868,7 @@
             <a:fld id="{23062CB9-5F79-4C32-958D-F2866C136539}" type="datetime1">
               <a:rPr lang="en-US" noProof="0" smtClean="0"/>
               <a:pPr/>
-              <a:t>12/11/17</a:t>
+              <a:t>12/12/17</a:t>
             </a:fld>
             <a:endParaRPr lang="fi-FI" noProof="0"/>
           </a:p>
@@ -4306,7 +4306,7 @@
             <a:fld id="{6C98A952-51ED-4AB3-91F4-F3A38B879BE4}" type="datetime1">
               <a:rPr lang="en-US" noProof="0" smtClean="0"/>
               <a:pPr/>
-              <a:t>12/11/17</a:t>
+              <a:t>12/12/17</a:t>
             </a:fld>
             <a:endParaRPr lang="fi-FI" noProof="0"/>
           </a:p>
@@ -4811,7 +4811,6 @@
               <a:rPr lang="fi-FI" sz="2000" smtClean="0"/>
               <a:t>kandiseminaari</a:t>
             </a:r>
-            <a:endParaRPr lang="fi-FI" sz="2000" smtClean="0"/>
           </a:p>
           <a:p>
             <a:r>
@@ -5157,11 +5156,7 @@
           <a:p>
             <a:r>
               <a:rPr lang="en-US"/>
-              <a:t>Millaisia sovellutuksia laiskalle evaluoinnille </a:t>
-            </a:r>
-            <a:r>
-              <a:rPr lang="en-US"/>
-              <a:t>on </a:t>
+              <a:t>Millaisia sovellutuksia laiskalle evaluoinnille on </a:t>
             </a:r>
             <a:r>
               <a:rPr lang="en-US" smtClean="0"/>
@@ -5557,10 +5552,6 @@
               <a:rPr lang="en-US" sz="2200"/>
               <a:t>Lataa kandini täältä:</a:t>
             </a:r>
-            <a:r>
-              <a:rPr lang="en-US" sz="2200"/>
-              <a:t/>
-            </a:r>
             <a:br>
               <a:rPr lang="en-US" sz="2200"/>
             </a:br>
@@ -6072,11 +6063,6 @@
               </a:rPr>
               <a:t>?</a:t>
             </a:r>
-            <a:endParaRPr lang="en-US" dirty="0">
-              <a:solidFill>
-                <a:schemeClr val="accent1"/>
-              </a:solidFill>
-            </a:endParaRPr>
           </a:p>
         </p:txBody>
       </p:sp>
@@ -6444,11 +6430,6 @@
               </a:rPr>
               <a:t>?</a:t>
             </a:r>
-            <a:endParaRPr lang="en-US" dirty="0">
-              <a:solidFill>
-                <a:schemeClr val="accent1"/>
-              </a:solidFill>
-            </a:endParaRPr>
           </a:p>
         </p:txBody>
       </p:sp>
@@ -6548,8 +6529,8 @@
         </p:nvSpPr>
         <p:spPr>
           <a:xfrm>
-            <a:off x="760064" y="4349422"/>
-            <a:ext cx="7988400" cy="1815882"/>
+            <a:off x="760064" y="4361036"/>
+            <a:ext cx="7988400" cy="2308324"/>
           </a:xfrm>
           <a:prstGeom prst="rect">
             <a:avLst/>
@@ -6562,10 +6543,11 @@
           <a:lstStyle/>
           <a:p>
             <a:r>
-              <a:rPr lang="fi-FI" sz="1600" b="1">
+              <a:rPr lang="en-US" sz="1600" b="1">
                 <a:solidFill>
                   <a:srgbClr val="000000"/>
                 </a:solidFill>
+                <a:effectLst/>
                 <a:latin typeface="Consolas" charset="0"/>
                 <a:ea typeface="Consolas" charset="0"/>
                 <a:cs typeface="Consolas" charset="0"/>
@@ -6573,10 +6555,11 @@
               <a:t>def</a:t>
             </a:r>
             <a:r>
-              <a:rPr lang="fi-FI" sz="1600">
+              <a:rPr lang="en-US" sz="1600">
                 <a:solidFill>
                   <a:srgbClr val="000000"/>
                 </a:solidFill>
+                <a:effectLst/>
                 <a:latin typeface="Consolas" charset="0"/>
                 <a:ea typeface="Consolas" charset="0"/>
                 <a:cs typeface="Consolas" charset="0"/>
@@ -6584,10 +6567,11 @@
               <a:t> </a:t>
             </a:r>
             <a:r>
-              <a:rPr lang="fi-FI" sz="1600">
-                <a:solidFill>
-                  <a:srgbClr val="010181"/>
-                </a:solidFill>
+              <a:rPr lang="en-US" sz="1600">
+                <a:solidFill>
+                  <a:srgbClr val="021994"/>
+                </a:solidFill>
+                <a:effectLst/>
                 <a:latin typeface="Consolas" charset="0"/>
                 <a:ea typeface="Consolas" charset="0"/>
                 <a:cs typeface="Consolas" charset="0"/>
@@ -6595,55 +6579,69 @@
               <a:t>printValuePlusOne</a:t>
             </a:r>
             <a:r>
-              <a:rPr lang="fi-FI" sz="1600">
+              <a:rPr lang="en-US" sz="1600">
                 <a:solidFill>
                   <a:srgbClr val="000000"/>
                 </a:solidFill>
+                <a:effectLst/>
                 <a:latin typeface="Consolas" charset="0"/>
                 <a:ea typeface="Consolas" charset="0"/>
                 <a:cs typeface="Consolas" charset="0"/>
               </a:rPr>
               <a:t>(parameter):</a:t>
             </a:r>
-          </a:p>
-          <a:p>
-            <a:r>
-              <a:rPr lang="fi-FI" sz="1600">
-                <a:solidFill>
-                  <a:srgbClr val="000000"/>
-                </a:solidFill>
+            <a:endParaRPr lang="en-US" sz="1600">
+              <a:solidFill>
+                <a:srgbClr val="021994"/>
+              </a:solidFill>
+              <a:effectLst/>
+              <a:latin typeface="Consolas" charset="0"/>
+              <a:ea typeface="Consolas" charset="0"/>
+              <a:cs typeface="Consolas" charset="0"/>
+            </a:endParaRPr>
+          </a:p>
+          <a:p>
+            <a:r>
+              <a:rPr lang="en-US" sz="1600">
+                <a:effectLst/>
                 <a:latin typeface="Consolas" charset="0"/>
                 <a:ea typeface="Consolas" charset="0"/>
                 <a:cs typeface="Consolas" charset="0"/>
               </a:rPr>
-              <a:t>  parameter = parameter + </a:t>
-            </a:r>
-            <a:r>
-              <a:rPr lang="fi-FI" sz="1600">
-                <a:solidFill>
-                  <a:srgbClr val="B07E00"/>
-                </a:solidFill>
+              <a:t>  parameter = parameter + </a:t>
+            </a:r>
+            <a:r>
+              <a:rPr lang="en-US" sz="1600">
+                <a:solidFill>
+                  <a:srgbClr val="BF8F00"/>
+                </a:solidFill>
+                <a:effectLst/>
                 <a:latin typeface="Consolas" charset="0"/>
                 <a:ea typeface="Consolas" charset="0"/>
                 <a:cs typeface="Consolas" charset="0"/>
               </a:rPr>
               <a:t>1</a:t>
             </a:r>
-          </a:p>
-          <a:p>
-            <a:r>
-              <a:rPr lang="fi-FI" sz="1600">
+            <a:endParaRPr lang="en-US" sz="1600">
+              <a:effectLst/>
+              <a:latin typeface="Consolas" charset="0"/>
+              <a:ea typeface="Consolas" charset="0"/>
+              <a:cs typeface="Consolas" charset="0"/>
+            </a:endParaRPr>
+          </a:p>
+          <a:p>
+            <a:r>
+              <a:rPr lang="en-US" sz="1600">
+                <a:effectLst/>
                 <a:latin typeface="Consolas" charset="0"/>
                 <a:ea typeface="Consolas" charset="0"/>
                 <a:cs typeface="Consolas" charset="0"/>
               </a:rPr>
-              <a:t>  </a:t>
-            </a:r>
-            <a:r>
-              <a:rPr lang="fi-FI" sz="1600" b="1">
-                <a:solidFill>
-                  <a:srgbClr val="000000"/>
-                </a:solidFill>
+              <a:t>  </a:t>
+            </a:r>
+            <a:r>
+              <a:rPr lang="en-US" sz="1600" b="1">
+                <a:effectLst/>
                 <a:latin typeface="Consolas" charset="0"/>
                 <a:ea typeface="Consolas" charset="0"/>
                 <a:cs typeface="Consolas" charset="0"/>
@@ -6651,10 +6649,8 @@
               <a:t>print</a:t>
             </a:r>
             <a:r>
-              <a:rPr lang="fi-FI" sz="1600">
-                <a:solidFill>
-                  <a:srgbClr val="000000"/>
-                </a:solidFill>
+              <a:rPr lang="en-US" sz="1600">
+                <a:effectLst/>
                 <a:latin typeface="Consolas" charset="0"/>
                 <a:ea typeface="Consolas" charset="0"/>
                 <a:cs typeface="Consolas" charset="0"/>
@@ -6662,30 +6658,30 @@
               <a:t> </a:t>
             </a:r>
             <a:r>
-              <a:rPr lang="fi-FI" sz="1600">
-                <a:solidFill>
-                  <a:srgbClr val="BF0303"/>
-                </a:solidFill>
+              <a:rPr lang="en-US" sz="1600">
+                <a:solidFill>
+                  <a:srgbClr val="CD1D00"/>
+                </a:solidFill>
+                <a:effectLst/>
                 <a:latin typeface="Consolas" charset="0"/>
                 <a:ea typeface="Consolas" charset="0"/>
                 <a:cs typeface="Consolas" charset="0"/>
               </a:rPr>
-              <a:t>"Value is: " </a:t>
-            </a:r>
-            <a:r>
-              <a:rPr lang="fi-FI" sz="1600">
-                <a:solidFill>
-                  <a:srgbClr val="000000"/>
-                </a:solidFill>
+              <a:t>"Value is: "</a:t>
+            </a:r>
+            <a:r>
+              <a:rPr lang="en-US" sz="1600">
+                <a:effectLst/>
                 <a:latin typeface="Consolas" charset="0"/>
                 <a:ea typeface="Consolas" charset="0"/>
                 <a:cs typeface="Consolas" charset="0"/>
               </a:rPr>
-              <a:t>+ parameter</a:t>
-            </a:r>
-          </a:p>
-          <a:p>
-            <a:endParaRPr lang="fi-FI" sz="1600">
+              <a:t> + parameter</a:t>
+            </a:r>
+          </a:p>
+          <a:p>
+            <a:endParaRPr lang="en-US" sz="1600">
+              <a:effectLst/>
               <a:latin typeface="Consolas" charset="0"/>
               <a:ea typeface="Consolas" charset="0"/>
               <a:cs typeface="Consolas" charset="0"/>
@@ -6693,10 +6689,11 @@
           </a:p>
           <a:p>
             <a:r>
-              <a:rPr lang="fi-FI" sz="1600">
-                <a:solidFill>
-                  <a:srgbClr val="010181"/>
-                </a:solidFill>
+              <a:rPr lang="en-US" sz="1600">
+                <a:solidFill>
+                  <a:srgbClr val="021994"/>
+                </a:solidFill>
+                <a:effectLst/>
                 <a:latin typeface="Consolas" charset="0"/>
                 <a:ea typeface="Consolas" charset="0"/>
                 <a:cs typeface="Consolas" charset="0"/>
@@ -6704,10 +6701,11 @@
               <a:t>printValuePlusOne</a:t>
             </a:r>
             <a:r>
-              <a:rPr lang="fi-FI" sz="1600">
+              <a:rPr lang="en-US" sz="1600">
                 <a:solidFill>
                   <a:srgbClr val="000000"/>
                 </a:solidFill>
+                <a:effectLst/>
                 <a:latin typeface="Consolas" charset="0"/>
                 <a:ea typeface="Consolas" charset="0"/>
                 <a:cs typeface="Consolas" charset="0"/>
@@ -6715,21 +6713,47 @@
               <a:t>(</a:t>
             </a:r>
             <a:r>
-              <a:rPr lang="fi-FI" sz="1600">
-                <a:solidFill>
-                  <a:srgbClr val="B07E00"/>
-                </a:solidFill>
+              <a:rPr lang="en-US" sz="1600">
+                <a:solidFill>
+                  <a:srgbClr val="BF8F00"/>
+                </a:solidFill>
+                <a:effectLst/>
                 <a:latin typeface="Consolas" charset="0"/>
                 <a:ea typeface="Consolas" charset="0"/>
                 <a:cs typeface="Consolas" charset="0"/>
               </a:rPr>
-              <a:t>335</a:t>
-            </a:r>
-            <a:r>
-              <a:rPr lang="fi-FI" sz="1600">
+              <a:t>25</a:t>
+            </a:r>
+            <a:r>
+              <a:rPr lang="en-US" sz="1600">
                 <a:solidFill>
                   <a:srgbClr val="000000"/>
                 </a:solidFill>
+                <a:effectLst/>
+                <a:latin typeface="Consolas" charset="0"/>
+                <a:ea typeface="Consolas" charset="0"/>
+                <a:cs typeface="Consolas" charset="0"/>
+              </a:rPr>
+              <a:t> * </a:t>
+            </a:r>
+            <a:r>
+              <a:rPr lang="en-US" sz="1600">
+                <a:solidFill>
+                  <a:srgbClr val="BF8F00"/>
+                </a:solidFill>
+                <a:effectLst/>
+                <a:latin typeface="Consolas" charset="0"/>
+                <a:ea typeface="Consolas" charset="0"/>
+                <a:cs typeface="Consolas" charset="0"/>
+              </a:rPr>
+              <a:t>12</a:t>
+            </a:r>
+            <a:r>
+              <a:rPr lang="en-US" sz="1600">
+                <a:solidFill>
+                  <a:srgbClr val="000000"/>
+                </a:solidFill>
+                <a:effectLst/>
                 <a:latin typeface="Consolas" charset="0"/>
                 <a:ea typeface="Consolas" charset="0"/>
                 <a:cs typeface="Consolas" charset="0"/>
@@ -6737,20 +6761,22 @@
               <a:t>) </a:t>
             </a:r>
             <a:r>
-              <a:rPr lang="fi-FI" sz="1600" i="1">
-                <a:solidFill>
-                  <a:srgbClr val="838183"/>
-                </a:solidFill>
+              <a:rPr lang="en-US" sz="1600" i="1">
+                <a:solidFill>
+                  <a:srgbClr val="959395"/>
+                </a:solidFill>
+                <a:effectLst/>
                 <a:latin typeface="Consolas" charset="0"/>
                 <a:ea typeface="Consolas" charset="0"/>
                 <a:cs typeface="Consolas" charset="0"/>
               </a:rPr>
-              <a:t># Literaali parametrina</a:t>
-            </a:r>
-            <a:endParaRPr lang="fi-FI" sz="1600">
+              <a:t># Aritmeettinen lauseke parametrina</a:t>
+            </a:r>
+            <a:endParaRPr lang="en-US" sz="1600">
               <a:solidFill>
-                <a:srgbClr val="838183"/>
+                <a:srgbClr val="959395"/>
               </a:solidFill>
+              <a:effectLst/>
               <a:latin typeface="Consolas" charset="0"/>
               <a:ea typeface="Consolas" charset="0"/>
               <a:cs typeface="Consolas" charset="0"/>
@@ -6758,10 +6784,11 @@
           </a:p>
           <a:p>
             <a:r>
-              <a:rPr lang="fi-FI" sz="1600">
-                <a:solidFill>
-                  <a:srgbClr val="010181"/>
-                </a:solidFill>
+              <a:rPr lang="en-US" sz="1600">
+                <a:solidFill>
+                  <a:srgbClr val="021994"/>
+                </a:solidFill>
+                <a:effectLst/>
                 <a:latin typeface="Consolas" charset="0"/>
                 <a:ea typeface="Consolas" charset="0"/>
                 <a:cs typeface="Consolas" charset="0"/>
@@ -6769,10 +6796,11 @@
               <a:t>printValuePlusOne</a:t>
             </a:r>
             <a:r>
-              <a:rPr lang="fi-FI" sz="1600">
+              <a:rPr lang="en-US" sz="1600">
                 <a:solidFill>
                   <a:srgbClr val="000000"/>
                 </a:solidFill>
+                <a:effectLst/>
                 <a:latin typeface="Consolas" charset="0"/>
                 <a:ea typeface="Consolas" charset="0"/>
                 <a:cs typeface="Consolas" charset="0"/>
@@ -6780,64 +6808,46 @@
               <a:t>(</a:t>
             </a:r>
             <a:r>
-              <a:rPr lang="fi-FI" sz="1600">
-                <a:solidFill>
-                  <a:srgbClr val="B07E00"/>
-                </a:solidFill>
+              <a:rPr lang="en-US" sz="1600">
+                <a:solidFill>
+                  <a:srgbClr val="021994"/>
+                </a:solidFill>
+                <a:effectLst/>
                 <a:latin typeface="Consolas" charset="0"/>
                 <a:ea typeface="Consolas" charset="0"/>
                 <a:cs typeface="Consolas" charset="0"/>
               </a:rPr>
-              <a:t>25 </a:t>
-            </a:r>
-            <a:r>
-              <a:rPr lang="fi-FI" sz="1600">
+              <a:t>someMethod</a:t>
+            </a:r>
+            <a:r>
+              <a:rPr lang="en-US" sz="1600">
                 <a:solidFill>
                   <a:srgbClr val="000000"/>
                 </a:solidFill>
+                <a:effectLst/>
                 <a:latin typeface="Consolas" charset="0"/>
                 <a:ea typeface="Consolas" charset="0"/>
                 <a:cs typeface="Consolas" charset="0"/>
               </a:rPr>
-              <a:t>* </a:t>
-            </a:r>
-            <a:r>
-              <a:rPr lang="fi-FI" sz="1600">
-                <a:solidFill>
-                  <a:srgbClr val="B07E00"/>
-                </a:solidFill>
+              <a:t>()) </a:t>
+            </a:r>
+            <a:r>
+              <a:rPr lang="en-US" sz="1600" i="1">
+                <a:solidFill>
+                  <a:srgbClr val="959395"/>
+                </a:solidFill>
+                <a:effectLst/>
                 <a:latin typeface="Consolas" charset="0"/>
                 <a:ea typeface="Consolas" charset="0"/>
                 <a:cs typeface="Consolas" charset="0"/>
               </a:rPr>
-              <a:t>12</a:t>
-            </a:r>
-            <a:r>
-              <a:rPr lang="fi-FI" sz="1600">
-                <a:solidFill>
-                  <a:srgbClr val="000000"/>
-                </a:solidFill>
-                <a:latin typeface="Consolas" charset="0"/>
-                <a:ea typeface="Consolas" charset="0"/>
-                <a:cs typeface="Consolas" charset="0"/>
-              </a:rPr>
-              <a:t>) </a:t>
-            </a:r>
-            <a:r>
-              <a:rPr lang="fi-FI" sz="1600" i="1">
-                <a:solidFill>
-                  <a:srgbClr val="838183"/>
-                </a:solidFill>
-                <a:latin typeface="Consolas" charset="0"/>
-                <a:ea typeface="Consolas" charset="0"/>
-                <a:cs typeface="Consolas" charset="0"/>
-              </a:rPr>
-              <a:t># Aritmeettinen lauseke parametrina</a:t>
-            </a:r>
-            <a:endParaRPr lang="fi-FI" sz="1600">
+              <a:t># Funktiokutsu parametrina</a:t>
+            </a:r>
+            <a:endParaRPr lang="en-US" sz="1600">
               <a:solidFill>
-                <a:srgbClr val="838183"/>
+                <a:srgbClr val="021994"/>
               </a:solidFill>
+              <a:effectLst/>
               <a:latin typeface="Consolas" charset="0"/>
               <a:ea typeface="Consolas" charset="0"/>
               <a:cs typeface="Consolas" charset="0"/>
@@ -6845,10 +6855,11 @@
           </a:p>
           <a:p>
             <a:r>
-              <a:rPr lang="fi-FI" sz="1600">
-                <a:solidFill>
-                  <a:srgbClr val="010181"/>
-                </a:solidFill>
+              <a:rPr lang="en-US" sz="1600">
+                <a:solidFill>
+                  <a:srgbClr val="021994"/>
+                </a:solidFill>
+                <a:effectLst/>
                 <a:latin typeface="Consolas" charset="0"/>
                 <a:ea typeface="Consolas" charset="0"/>
                 <a:cs typeface="Consolas" charset="0"/>
@@ -6856,27 +6867,135 @@
               <a:t>printValuePlusOne</a:t>
             </a:r>
             <a:r>
-              <a:rPr lang="fi-FI" sz="1600">
+              <a:rPr lang="en-US" sz="1600">
                 <a:solidFill>
                   <a:srgbClr val="000000"/>
                 </a:solidFill>
+                <a:effectLst/>
                 <a:latin typeface="Consolas" charset="0"/>
                 <a:ea typeface="Consolas" charset="0"/>
                 <a:cs typeface="Consolas" charset="0"/>
               </a:rPr>
-              <a:t>(someDefinedVariable) </a:t>
-            </a:r>
-            <a:r>
-              <a:rPr lang="fi-FI" sz="1600" i="1">
-                <a:solidFill>
-                  <a:srgbClr val="838183"/>
-                </a:solidFill>
+              <a:t>(someVariable) </a:t>
+            </a:r>
+            <a:r>
+              <a:rPr lang="en-US" sz="1600" i="1">
+                <a:solidFill>
+                  <a:srgbClr val="959395"/>
+                </a:solidFill>
+                <a:effectLst/>
                 <a:latin typeface="Consolas" charset="0"/>
                 <a:ea typeface="Consolas" charset="0"/>
                 <a:cs typeface="Consolas" charset="0"/>
               </a:rPr>
-              <a:t># Muuttujalauseke parametrina</a:t>
-            </a:r>
+              <a:t># Muuttujaviittaus parametrina</a:t>
+            </a:r>
+            <a:endParaRPr lang="en-US" sz="1600">
+              <a:solidFill>
+                <a:srgbClr val="959395"/>
+              </a:solidFill>
+              <a:effectLst/>
+              <a:latin typeface="Consolas" charset="0"/>
+              <a:ea typeface="Consolas" charset="0"/>
+              <a:cs typeface="Consolas" charset="0"/>
+            </a:endParaRPr>
+          </a:p>
+          <a:p>
+            <a:r>
+              <a:rPr lang="en-US" sz="1600">
+                <a:solidFill>
+                  <a:srgbClr val="021994"/>
+                </a:solidFill>
+                <a:effectLst/>
+                <a:latin typeface="Consolas" charset="0"/>
+                <a:ea typeface="Consolas" charset="0"/>
+                <a:cs typeface="Consolas" charset="0"/>
+              </a:rPr>
+              <a:t>printValuePlusOne</a:t>
+            </a:r>
+            <a:r>
+              <a:rPr lang="en-US" sz="1600">
+                <a:solidFill>
+                  <a:srgbClr val="000000"/>
+                </a:solidFill>
+                <a:effectLst/>
+                <a:latin typeface="Consolas" charset="0"/>
+                <a:ea typeface="Consolas" charset="0"/>
+                <a:cs typeface="Consolas" charset="0"/>
+              </a:rPr>
+              <a:t>(</a:t>
+            </a:r>
+            <a:r>
+              <a:rPr lang="en-US" sz="1600">
+                <a:solidFill>
+                  <a:srgbClr val="BF8F00"/>
+                </a:solidFill>
+                <a:effectLst/>
+                <a:latin typeface="Consolas" charset="0"/>
+                <a:ea typeface="Consolas" charset="0"/>
+                <a:cs typeface="Consolas" charset="0"/>
+              </a:rPr>
+              <a:t>5</a:t>
+            </a:r>
+            <a:r>
+              <a:rPr lang="en-US" sz="1600">
+                <a:solidFill>
+                  <a:srgbClr val="000000"/>
+                </a:solidFill>
+                <a:effectLst/>
+                <a:latin typeface="Consolas" charset="0"/>
+                <a:ea typeface="Consolas" charset="0"/>
+                <a:cs typeface="Consolas" charset="0"/>
+              </a:rPr>
+              <a:t> + </a:t>
+            </a:r>
+            <a:r>
+              <a:rPr lang="en-US" sz="1600">
+                <a:solidFill>
+                  <a:srgbClr val="021994"/>
+                </a:solidFill>
+                <a:effectLst/>
+                <a:latin typeface="Consolas" charset="0"/>
+                <a:ea typeface="Consolas" charset="0"/>
+                <a:cs typeface="Consolas" charset="0"/>
+              </a:rPr>
+              <a:t>someMethod</a:t>
+            </a:r>
+            <a:r>
+              <a:rPr lang="en-US" sz="1600">
+                <a:solidFill>
+                  <a:srgbClr val="000000"/>
+                </a:solidFill>
+                <a:effectLst/>
+                <a:latin typeface="Consolas" charset="0"/>
+                <a:ea typeface="Consolas" charset="0"/>
+                <a:cs typeface="Consolas" charset="0"/>
+              </a:rPr>
+              <a:t>() * someVariable) </a:t>
+            </a:r>
+            <a:r>
+              <a:rPr lang="en-US" sz="1600" i="1">
+                <a:solidFill>
+                  <a:srgbClr val="959395"/>
+                </a:solidFill>
+                <a:effectLst/>
+                <a:latin typeface="Consolas" charset="0"/>
+                <a:ea typeface="Consolas" charset="0"/>
+                <a:cs typeface="Consolas" charset="0"/>
+              </a:rPr>
+              <a:t># Yhdistelmä</a:t>
+            </a:r>
+            <a:endParaRPr lang="en-US" sz="1600">
+              <a:solidFill>
+                <a:srgbClr val="021994"/>
+              </a:solidFill>
+              <a:effectLst/>
+              <a:latin typeface="Consolas" charset="0"/>
+              <a:ea typeface="Consolas" charset="0"/>
+              <a:cs typeface="Consolas" charset="0"/>
+            </a:endParaRPr>
+          </a:p>
+          <a:p>
             <a:endParaRPr lang="fi-FI" sz="1600">
               <a:solidFill>
                 <a:srgbClr val="838183"/>
@@ -7099,7 +7218,6 @@
               <a:rPr lang="fi-FI" sz="2300"/>
               <a:t>Heti, kun funktiota kutsutaan, ennen kuin funktion ohjelmakoodin suoritus alkaa</a:t>
             </a:r>
-            <a:endParaRPr lang="fi-FI" sz="2300"/>
           </a:p>
         </p:txBody>
       </p:sp>
@@ -7347,11 +7465,7 @@
           <a:p>
             <a:r>
               <a:rPr lang="fi-FI" sz="2300"/>
-              <a:t>Käytössä varsin harvoissa ohjelmointikielissä, joista tunnetuin esimerkki </a:t>
-            </a:r>
-            <a:r>
-              <a:rPr lang="fi-FI" sz="2300"/>
-              <a:t>on </a:t>
+              <a:t>Käytössä varsin harvoissa ohjelmointikielissä, joista tunnetuin esimerkki on </a:t>
             </a:r>
             <a:r>
               <a:rPr lang="fi-FI" sz="2300" smtClean="0"/>
@@ -7698,11 +7812,7 @@
             </a:r>
             <a:r>
               <a:rPr lang="en-US"/>
-              <a:t>laiskan </a:t>
-            </a:r>
-            <a:r>
-              <a:rPr lang="en-US"/>
-              <a:t>evaluoinnin </a:t>
+              <a:t>laiskan evaluoinnin </a:t>
             </a:r>
             <a:r>
               <a:rPr lang="en-US" smtClean="0"/>

</xml_diff>